<commit_message>
ban update hoan chinh
</commit_message>
<xml_diff>
--- a/thesis/csn-da21ttb-TrangThanhHieu.pptx
+++ b/thesis/csn-da21ttb-TrangThanhHieu.pptx
@@ -9078,7 +9078,7 @@
           <a:p>
             <a:fld id="{7487ADD9-2083-264C-A652-8D52D02F7E72}" type="datetimeFigureOut">
               <a:rPr lang="en-US" smtClean="0"/>
-              <a:t>1/15/2024</a:t>
+              <a:t>1/16/2024</a:t>
             </a:fld>
             <a:endParaRPr lang="en-US" dirty="0"/>
           </a:p>
@@ -10734,7 +10734,7 @@
           <a:p>
             <a:fld id="{AE46C21D-EBB5-4F3D-B06D-166777189317}" type="datetime1">
               <a:rPr lang="en-US" smtClean="0"/>
-              <a:t>1/15/2024</a:t>
+              <a:t>1/16/2024</a:t>
             </a:fld>
             <a:endParaRPr lang="en-US" dirty="0"/>
           </a:p>
@@ -11618,7 +11618,7 @@
           <a:p>
             <a:fld id="{1DFFEA26-EB1D-498C-95CD-1ECE586790AA}" type="datetime1">
               <a:rPr lang="en-US" smtClean="0"/>
-              <a:t>1/15/2024</a:t>
+              <a:t>1/16/2024</a:t>
             </a:fld>
             <a:endParaRPr lang="en-US" dirty="0"/>
           </a:p>
@@ -12794,7 +12794,7 @@
           <a:p>
             <a:fld id="{539842EE-D56F-4F18-94E7-094CEF23F906}" type="datetime1">
               <a:rPr lang="en-US" smtClean="0"/>
-              <a:t>1/15/2024</a:t>
+              <a:t>1/16/2024</a:t>
             </a:fld>
             <a:endParaRPr lang="en-US" dirty="0"/>
           </a:p>
@@ -14142,7 +14142,7 @@
           <a:p>
             <a:fld id="{A5915655-EB65-4EF2-BA0C-DCB11AE1B320}" type="datetimeFigureOut">
               <a:rPr lang="en-US" smtClean="0"/>
-              <a:t>1/15/2024</a:t>
+              <a:t>1/16/2024</a:t>
             </a:fld>
             <a:endParaRPr lang="en-US"/>
           </a:p>
@@ -14986,7 +14986,7 @@
           <a:p>
             <a:fld id="{45B08281-154C-4FEF-A6DF-18BA3AC0F374}" type="datetime1">
               <a:rPr lang="en-US" smtClean="0"/>
-              <a:t>1/15/2024</a:t>
+              <a:t>1/16/2024</a:t>
             </a:fld>
             <a:endParaRPr lang="en-US" dirty="0"/>
           </a:p>
@@ -15703,7 +15703,7 @@
           <a:p>
             <a:fld id="{04D857D4-BD7E-4A06-844B-AAD504F1114F}" type="datetime1">
               <a:rPr lang="en-US" smtClean="0"/>
-              <a:t>1/15/2024</a:t>
+              <a:t>1/16/2024</a:t>
             </a:fld>
             <a:endParaRPr lang="en-US" dirty="0"/>
           </a:p>
@@ -16930,7 +16930,7 @@
           <a:p>
             <a:fld id="{916AFA50-87A4-4E99-B112-8C6B1DFB84B2}" type="datetime1">
               <a:rPr lang="en-US" smtClean="0"/>
-              <a:t>1/15/2024</a:t>
+              <a:t>1/16/2024</a:t>
             </a:fld>
             <a:endParaRPr lang="en-US" dirty="0"/>
           </a:p>
@@ -17521,7 +17521,7 @@
           <a:p>
             <a:fld id="{6B3905CA-BF0F-4A1B-AA0D-85E42F5D5A85}" type="datetime1">
               <a:rPr lang="en-US" smtClean="0"/>
-              <a:t>1/15/2024</a:t>
+              <a:t>1/16/2024</a:t>
             </a:fld>
             <a:endParaRPr lang="en-US" dirty="0"/>
           </a:p>
@@ -17993,7 +17993,7 @@
           <a:p>
             <a:fld id="{D3DA9A77-60C0-4BB8-898D-2828EE4073AD}" type="datetime1">
               <a:rPr lang="en-US" smtClean="0"/>
-              <a:t>1/15/2024</a:t>
+              <a:t>1/16/2024</a:t>
             </a:fld>
             <a:endParaRPr lang="en-US" dirty="0"/>
           </a:p>
@@ -18842,7 +18842,7 @@
           <a:p>
             <a:fld id="{C1F30CD5-42B1-4614-9F46-5D29928CC2DB}" type="datetime1">
               <a:rPr lang="en-US" smtClean="0"/>
-              <a:t>1/15/2024</a:t>
+              <a:t>1/16/2024</a:t>
             </a:fld>
             <a:endParaRPr lang="en-US" dirty="0"/>
           </a:p>
@@ -21066,7 +21066,7 @@
           <a:p>
             <a:fld id="{EE6020E3-D95B-4E55-964F-4B1A98BDAA6F}" type="datetime1">
               <a:rPr lang="en-US" smtClean="0"/>
-              <a:t>1/15/2024</a:t>
+              <a:t>1/16/2024</a:t>
             </a:fld>
             <a:endParaRPr lang="en-US" dirty="0"/>
           </a:p>
@@ -21334,7 +21334,7 @@
           <a:p>
             <a:fld id="{FC9A72C8-1C87-42EF-8A11-BF6DFA19ED8B}" type="datetime1">
               <a:rPr lang="en-US" smtClean="0"/>
-              <a:t>1/15/2024</a:t>
+              <a:t>1/16/2024</a:t>
             </a:fld>
             <a:endParaRPr lang="en-US" dirty="0"/>
           </a:p>
@@ -34358,12 +34358,20 @@
         </p:blipFill>
         <p:spPr>
           <a:xfrm>
-            <a:off x="2589195" y="1350288"/>
-            <a:ext cx="8826395" cy="5294501"/>
+            <a:off x="1732548" y="1176062"/>
+            <a:ext cx="4871287" cy="2922035"/>
           </a:xfrm>
           <a:prstGeom prst="rect">
             <a:avLst/>
           </a:prstGeom>
+          <a:solidFill>
+            <a:schemeClr val="tx1"/>
+          </a:solidFill>
+          <a:ln>
+            <a:solidFill>
+              <a:schemeClr val="tx1"/>
+            </a:solidFill>
+          </a:ln>
         </p:spPr>
       </p:pic>
       <p:sp>
@@ -34574,6 +34582,114 @@
           </a:p>
         </p:txBody>
       </p:sp>
+      <p:pic>
+        <p:nvPicPr>
+          <p:cNvPr id="3" name="Picture 2">
+            <a:extLst>
+              <a:ext uri="{FF2B5EF4-FFF2-40B4-BE49-F238E27FC236}">
+                <a16:creationId xmlns:a16="http://schemas.microsoft.com/office/drawing/2014/main" id="{76838B43-2840-7C62-DD72-911C5D346B48}"/>
+              </a:ext>
+            </a:extLst>
+          </p:cNvPr>
+          <p:cNvPicPr>
+            <a:picLocks noChangeAspect="1"/>
+          </p:cNvPicPr>
+          <p:nvPr/>
+        </p:nvPicPr>
+        <p:blipFill>
+          <a:blip r:embed="rId3"/>
+          <a:stretch>
+            <a:fillRect/>
+          </a:stretch>
+        </p:blipFill>
+        <p:spPr>
+          <a:xfrm>
+            <a:off x="6921469" y="4339841"/>
+            <a:ext cx="3914274" cy="2381634"/>
+          </a:xfrm>
+          <a:prstGeom prst="rect">
+            <a:avLst/>
+          </a:prstGeom>
+          <a:solidFill>
+            <a:schemeClr val="tx1"/>
+          </a:solidFill>
+          <a:ln>
+            <a:solidFill>
+              <a:schemeClr val="tx1"/>
+            </a:solidFill>
+          </a:ln>
+        </p:spPr>
+      </p:pic>
+      <p:pic>
+        <p:nvPicPr>
+          <p:cNvPr id="7" name="Picture 6">
+            <a:extLst>
+              <a:ext uri="{FF2B5EF4-FFF2-40B4-BE49-F238E27FC236}">
+                <a16:creationId xmlns:a16="http://schemas.microsoft.com/office/drawing/2014/main" id="{D130972E-E740-0F3E-39EE-42576629F21B}"/>
+              </a:ext>
+            </a:extLst>
+          </p:cNvPr>
+          <p:cNvPicPr>
+            <a:picLocks noChangeAspect="1"/>
+          </p:cNvPicPr>
+          <p:nvPr/>
+        </p:nvPicPr>
+        <p:blipFill>
+          <a:blip r:embed="rId4"/>
+          <a:stretch>
+            <a:fillRect/>
+          </a:stretch>
+        </p:blipFill>
+        <p:spPr>
+          <a:xfrm>
+            <a:off x="1442209" y="4339841"/>
+            <a:ext cx="5161626" cy="2364946"/>
+          </a:xfrm>
+          <a:prstGeom prst="rect">
+            <a:avLst/>
+          </a:prstGeom>
+          <a:ln>
+            <a:solidFill>
+              <a:schemeClr val="tx1"/>
+            </a:solidFill>
+          </a:ln>
+        </p:spPr>
+      </p:pic>
+      <p:pic>
+        <p:nvPicPr>
+          <p:cNvPr id="11" name="Picture 10">
+            <a:extLst>
+              <a:ext uri="{FF2B5EF4-FFF2-40B4-BE49-F238E27FC236}">
+                <a16:creationId xmlns:a16="http://schemas.microsoft.com/office/drawing/2014/main" id="{F9167C9A-7BAC-22D8-75E9-5A588459084F}"/>
+              </a:ext>
+            </a:extLst>
+          </p:cNvPr>
+          <p:cNvPicPr>
+            <a:picLocks noChangeAspect="1"/>
+          </p:cNvPicPr>
+          <p:nvPr/>
+        </p:nvPicPr>
+        <p:blipFill>
+          <a:blip r:embed="rId5"/>
+          <a:stretch>
+            <a:fillRect/>
+          </a:stretch>
+        </p:blipFill>
+        <p:spPr>
+          <a:xfrm>
+            <a:off x="6726016" y="1176062"/>
+            <a:ext cx="3914274" cy="2927328"/>
+          </a:xfrm>
+          <a:prstGeom prst="rect">
+            <a:avLst/>
+          </a:prstGeom>
+          <a:ln>
+            <a:solidFill>
+              <a:schemeClr val="tx1"/>
+            </a:solidFill>
+          </a:ln>
+        </p:spPr>
+      </p:pic>
     </p:spTree>
     <p:extLst>
       <p:ext uri="{BB962C8B-B14F-4D97-AF65-F5344CB8AC3E}">
@@ -41937,7 +42053,7 @@
                   <a:schemeClr val="bg1"/>
                 </a:solidFill>
               </a:rPr>
-              <a:t>quá</a:t>
+              <a:t>hóa</a:t>
             </a:r>
             <a:r>
               <a:rPr lang="en-US" sz="2400" dirty="0">
@@ -43070,26 +43186,6 @@
 </file>
 
 <file path=customXml/item1.xml><?xml version="1.0" encoding="utf-8"?>
-<p:properties xmlns:p="http://schemas.microsoft.com/office/2006/metadata/properties" xmlns:xsi="http://www.w3.org/2001/XMLSchema-instance" xmlns:pc="http://schemas.microsoft.com/office/infopath/2007/PartnerControls">
-  <documentManagement>
-    <_ip_UnifiedCompliancePolicyUIAction xmlns="http://schemas.microsoft.com/sharepoint/v3" xsi:nil="true"/>
-    <Image xmlns="71af3243-3dd4-4a8d-8c0d-dd76da1f02a5">
-      <Url xsi:nil="true"/>
-      <Description xsi:nil="true"/>
-    </Image>
-    <Status xmlns="71af3243-3dd4-4a8d-8c0d-dd76da1f02a5">Not started</Status>
-    <_ip_UnifiedCompliancePolicyProperties xmlns="http://schemas.microsoft.com/sharepoint/v3" xsi:nil="true"/>
-    <ImageTagsTaxHTField xmlns="71af3243-3dd4-4a8d-8c0d-dd76da1f02a5">
-      <Terms xmlns="http://schemas.microsoft.com/office/infopath/2007/PartnerControls"/>
-    </ImageTagsTaxHTField>
-    <TaxCatchAll xmlns="230e9df3-be65-4c73-a93b-d1236ebd677e" xsi:nil="true"/>
-    <MediaServiceKeyPoints xmlns="71af3243-3dd4-4a8d-8c0d-dd76da1f02a5" xsi:nil="true"/>
-    <Background xmlns="71af3243-3dd4-4a8d-8c0d-dd76da1f02a5">false</Background>
-  </documentManagement>
-</p:properties>
-</file>
-
-<file path=customXml/item2.xml><?xml version="1.0" encoding="utf-8"?>
 <ct:contentTypeSchema xmlns:ct="http://schemas.microsoft.com/office/2006/metadata/contentType" xmlns:ma="http://schemas.microsoft.com/office/2006/metadata/properties/metaAttributes" ct:_="" ma:_="" ma:contentTypeName="Document" ma:contentTypeID="0x01010079F111ED35F8CC479449609E8A0923A6" ma:contentTypeVersion="28" ma:contentTypeDescription="Create a new document." ma:contentTypeScope="" ma:versionID="60f5a4f2d2b0abadcf532d48ebf9cb71">
   <xsd:schema xmlns:xsd="http://www.w3.org/2001/XMLSchema" xmlns:xs="http://www.w3.org/2001/XMLSchema" xmlns:p="http://schemas.microsoft.com/office/2006/metadata/properties" xmlns:ns1="http://schemas.microsoft.com/sharepoint/v3" xmlns:ns2="71af3243-3dd4-4a8d-8c0d-dd76da1f02a5" xmlns:ns3="16c05727-aa75-4e4a-9b5f-8a80a1165891" xmlns:ns4="230e9df3-be65-4c73-a93b-d1236ebd677e" targetNamespace="http://schemas.microsoft.com/office/2006/metadata/properties" ma:root="true" ma:fieldsID="7dd78129e6a1811f84807ad11c651531" ns1:_="" ns2:_="" ns3:_="" ns4:_="">
     <xsd:import namespace="http://schemas.microsoft.com/sharepoint/v3"/>
@@ -43401,6 +43497,26 @@
 </ct:contentTypeSchema>
 </file>
 
+<file path=customXml/item2.xml><?xml version="1.0" encoding="utf-8"?>
+<p:properties xmlns:p="http://schemas.microsoft.com/office/2006/metadata/properties" xmlns:xsi="http://www.w3.org/2001/XMLSchema-instance" xmlns:pc="http://schemas.microsoft.com/office/infopath/2007/PartnerControls">
+  <documentManagement>
+    <_ip_UnifiedCompliancePolicyUIAction xmlns="http://schemas.microsoft.com/sharepoint/v3" xsi:nil="true"/>
+    <Image xmlns="71af3243-3dd4-4a8d-8c0d-dd76da1f02a5">
+      <Url xsi:nil="true"/>
+      <Description xsi:nil="true"/>
+    </Image>
+    <Status xmlns="71af3243-3dd4-4a8d-8c0d-dd76da1f02a5">Not started</Status>
+    <_ip_UnifiedCompliancePolicyProperties xmlns="http://schemas.microsoft.com/sharepoint/v3" xsi:nil="true"/>
+    <ImageTagsTaxHTField xmlns="71af3243-3dd4-4a8d-8c0d-dd76da1f02a5">
+      <Terms xmlns="http://schemas.microsoft.com/office/infopath/2007/PartnerControls"/>
+    </ImageTagsTaxHTField>
+    <TaxCatchAll xmlns="230e9df3-be65-4c73-a93b-d1236ebd677e" xsi:nil="true"/>
+    <MediaServiceKeyPoints xmlns="71af3243-3dd4-4a8d-8c0d-dd76da1f02a5" xsi:nil="true"/>
+    <Background xmlns="71af3243-3dd4-4a8d-8c0d-dd76da1f02a5">false</Background>
+  </documentManagement>
+</p:properties>
+</file>
+
 <file path=customXml/item3.xml><?xml version="1.0" encoding="utf-8"?>
 <?mso-contentType ?>
 <FormTemplates xmlns="http://schemas.microsoft.com/sharepoint/v3/contenttype/forms">
@@ -43411,18 +43527,6 @@
 </file>
 
 <file path=customXml/itemProps1.xml><?xml version="1.0" encoding="utf-8"?>
-<ds:datastoreItem xmlns:ds="http://schemas.openxmlformats.org/officeDocument/2006/customXml" ds:itemID="{1342FAFE-88B4-49B4-9588-86CB0E564E50}">
-  <ds:schemaRefs>
-    <ds:schemaRef ds:uri="http://schemas.microsoft.com/office/2006/metadata/properties"/>
-    <ds:schemaRef ds:uri="http://schemas.microsoft.com/office/infopath/2007/PartnerControls"/>
-    <ds:schemaRef ds:uri="http://schemas.microsoft.com/sharepoint/v3"/>
-    <ds:schemaRef ds:uri="71af3243-3dd4-4a8d-8c0d-dd76da1f02a5"/>
-    <ds:schemaRef ds:uri="230e9df3-be65-4c73-a93b-d1236ebd677e"/>
-  </ds:schemaRefs>
-</ds:datastoreItem>
-</file>
-
-<file path=customXml/itemProps2.xml><?xml version="1.0" encoding="utf-8"?>
 <ds:datastoreItem xmlns:ds="http://schemas.openxmlformats.org/officeDocument/2006/customXml" ds:itemID="{81C465B7-820B-4DEA-AB4B-5167C1BE9075}">
   <ds:schemaRefs>
     <ds:schemaRef ds:uri="http://schemas.microsoft.com/office/2006/metadata/contentType"/>
@@ -43443,6 +43547,18 @@
 </ds:datastoreItem>
 </file>
 
+<file path=customXml/itemProps2.xml><?xml version="1.0" encoding="utf-8"?>
+<ds:datastoreItem xmlns:ds="http://schemas.openxmlformats.org/officeDocument/2006/customXml" ds:itemID="{1342FAFE-88B4-49B4-9588-86CB0E564E50}">
+  <ds:schemaRefs>
+    <ds:schemaRef ds:uri="http://schemas.microsoft.com/office/2006/metadata/properties"/>
+    <ds:schemaRef ds:uri="http://schemas.microsoft.com/office/infopath/2007/PartnerControls"/>
+    <ds:schemaRef ds:uri="http://schemas.microsoft.com/sharepoint/v3"/>
+    <ds:schemaRef ds:uri="71af3243-3dd4-4a8d-8c0d-dd76da1f02a5"/>
+    <ds:schemaRef ds:uri="230e9df3-be65-4c73-a93b-d1236ebd677e"/>
+  </ds:schemaRefs>
+</ds:datastoreItem>
+</file>
+
 <file path=customXml/itemProps3.xml><?xml version="1.0" encoding="utf-8"?>
 <ds:datastoreItem xmlns:ds="http://schemas.openxmlformats.org/officeDocument/2006/customXml" ds:itemID="{42076B5C-85B0-4D30-852D-5E5312EEA93B}">
   <ds:schemaRefs>

</xml_diff>